<commit_message>
fixed typos in L9.4 and L9.5
</commit_message>
<xml_diff>
--- a/Slides/Lesson 9.4 Testing Simple Objects.pptx
+++ b/Slides/Lesson 9.4 Testing Simple Objects.pptx
@@ -232,7 +232,7 @@
           <a:p>
             <a:fld id="{36D53524-F9CC-4A8B-8CCD-2FA372311425}" type="datetimeFigureOut">
               <a:rPr lang="en-US" smtClean="0"/>
-              <a:t>11/2/2016</a:t>
+              <a:t>11/9/2016</a:t>
             </a:fld>
             <a:endParaRPr lang="en-US"/>
           </a:p>
@@ -762,7 +762,7 @@
           <a:p>
             <a:fld id="{2F1F79F5-7BEC-496A-AFC7-876E38F64D71}" type="datetime1">
               <a:rPr lang="en-US" smtClean="0"/>
-              <a:t>11/2/2016</a:t>
+              <a:t>11/9/2016</a:t>
             </a:fld>
             <a:endParaRPr lang="en-US"/>
           </a:p>
@@ -879,7 +879,7 @@
           <a:p>
             <a:fld id="{2F7B77F5-1464-4F6B-92A8-64FC8A508293}" type="datetime1">
               <a:rPr lang="en-US" smtClean="0"/>
-              <a:t>11/2/2016</a:t>
+              <a:t>11/9/2016</a:t>
             </a:fld>
             <a:endParaRPr lang="en-US"/>
           </a:p>
@@ -974,7 +974,7 @@
           <a:p>
             <a:fld id="{0A05703A-7669-4FEA-9056-25299B4D29D4}" type="datetime1">
               <a:rPr lang="en-US" smtClean="0"/>
-              <a:t>11/2/2016</a:t>
+              <a:t>11/9/2016</a:t>
             </a:fld>
             <a:endParaRPr lang="en-US"/>
           </a:p>
@@ -1249,7 +1249,7 @@
           <a:p>
             <a:fld id="{6E5077B5-BB57-49DB-88CA-226A139E5C01}" type="datetime1">
               <a:rPr lang="en-US" smtClean="0"/>
-              <a:t>11/2/2016</a:t>
+              <a:t>11/9/2016</a:t>
             </a:fld>
             <a:endParaRPr lang="en-US"/>
           </a:p>
@@ -1501,7 +1501,7 @@
           <a:p>
             <a:fld id="{C48D9447-CBD6-49A1-89FD-8512A8CF8999}" type="datetime1">
               <a:rPr lang="en-US" smtClean="0"/>
-              <a:t>11/2/2016</a:t>
+              <a:t>11/9/2016</a:t>
             </a:fld>
             <a:endParaRPr lang="en-US"/>
           </a:p>
@@ -1669,7 +1669,7 @@
           <a:p>
             <a:fld id="{A3639A2A-823D-48B7-9ACE-7FAF42870BA9}" type="datetime1">
               <a:rPr lang="en-US" smtClean="0"/>
-              <a:t>11/2/2016</a:t>
+              <a:t>11/9/2016</a:t>
             </a:fld>
             <a:endParaRPr lang="en-US"/>
           </a:p>
@@ -1847,7 +1847,7 @@
           <a:p>
             <a:fld id="{ED1B6996-82E9-463C-972C-7B56056E426C}" type="datetime1">
               <a:rPr lang="en-US" smtClean="0"/>
-              <a:t>11/2/2016</a:t>
+              <a:t>11/9/2016</a:t>
             </a:fld>
             <a:endParaRPr lang="en-US"/>
           </a:p>
@@ -2021,7 +2021,7 @@
           <a:p>
             <a:fld id="{E22ED4DA-448D-4BB1-B935-CC112220207B}" type="datetime1">
               <a:rPr lang="en-US" smtClean="0"/>
-              <a:t>11/2/2016</a:t>
+              <a:t>11/9/2016</a:t>
             </a:fld>
             <a:endParaRPr lang="en-US"/>
           </a:p>
@@ -2194,7 +2194,7 @@
           <a:p>
             <a:fld id="{E22ED4DA-448D-4BB1-B935-CC112220207B}" type="datetime1">
               <a:rPr lang="en-US" smtClean="0"/>
-              <a:t>11/2/2016</a:t>
+              <a:t>11/9/2016</a:t>
             </a:fld>
             <a:endParaRPr lang="en-US"/>
           </a:p>
@@ -2454,7 +2454,7 @@
           <a:p>
             <a:fld id="{FF5D65A6-AB94-4435-B0B7-3743215FA46C}" type="datetime1">
               <a:rPr lang="en-US" smtClean="0"/>
-              <a:t>11/2/2016</a:t>
+              <a:t>11/9/2016</a:t>
             </a:fld>
             <a:endParaRPr lang="en-US"/>
           </a:p>
@@ -2630,7 +2630,7 @@
           <a:p>
             <a:fld id="{FF5D65A6-AB94-4435-B0B7-3743215FA46C}" type="datetime1">
               <a:rPr lang="en-US" smtClean="0"/>
-              <a:t>11/2/2016</a:t>
+              <a:t>11/9/2016</a:t>
             </a:fld>
             <a:endParaRPr lang="en-US"/>
           </a:p>
@@ -2924,7 +2924,7 @@
           <a:p>
             <a:fld id="{7C193DC4-6EF0-48C9-B29C-616106A645E1}" type="datetime1">
               <a:rPr lang="en-US" smtClean="0"/>
-              <a:t>11/2/2016</a:t>
+              <a:t>11/9/2016</a:t>
             </a:fld>
             <a:endParaRPr lang="en-US"/>
           </a:p>
@@ -3209,7 +3209,7 @@
           <a:p>
             <a:fld id="{5D1846AD-9252-4647-9435-4C2AC365653A}" type="datetime1">
               <a:rPr lang="en-US" smtClean="0"/>
-              <a:t>11/2/2016</a:t>
+              <a:t>11/9/2016</a:t>
             </a:fld>
             <a:endParaRPr lang="en-US"/>
           </a:p>
@@ -3502,7 +3502,7 @@
           <a:p>
             <a:fld id="{5D1846AD-9252-4647-9435-4C2AC365653A}" type="datetime1">
               <a:rPr lang="en-US" smtClean="0"/>
-              <a:t>11/2/2016</a:t>
+              <a:t>11/9/2016</a:t>
             </a:fld>
             <a:endParaRPr lang="en-US"/>
           </a:p>
@@ -3921,7 +3921,7 @@
           <a:p>
             <a:fld id="{CE56DC10-3561-4063-A6AF-C1CC7A41040A}" type="datetime1">
               <a:rPr lang="en-US" smtClean="0"/>
-              <a:t>11/2/2016</a:t>
+              <a:t>11/9/2016</a:t>
             </a:fld>
             <a:endParaRPr lang="en-US"/>
           </a:p>
@@ -4144,7 +4144,7 @@
           <a:p>
             <a:fld id="{02B3F677-983B-48DB-ADFD-63FE6CBC7FB2}" type="datetime1">
               <a:rPr lang="en-US" smtClean="0"/>
-              <a:t>11/2/2016</a:t>
+              <a:t>11/9/2016</a:t>
             </a:fld>
             <a:endParaRPr lang="en-US"/>
           </a:p>
@@ -5333,7 +5333,7 @@
         <p:spPr>
           <a:xfrm>
             <a:off x="271851" y="4930233"/>
-            <a:ext cx="3616657" cy="1569660"/>
+            <a:ext cx="3616657" cy="1200329"/>
           </a:xfrm>
           <a:prstGeom prst="rect">
             <a:avLst/>
@@ -5374,7 +5374,15 @@
             <a:pPr algn="l"/>
             <a:r>
               <a:rPr lang="en-US" sz="2400" dirty="0"/>
-              <a:t>This works with ANY object whose class that implements </a:t>
+              <a:t>This works with ANY object </a:t>
+            </a:r>
+            <a:r>
+              <a:rPr lang="en-US" sz="2400"/>
+              <a:t>whose class </a:t>
+            </a:r>
+            <a:r>
+              <a:rPr lang="en-US" sz="2400" dirty="0"/>
+              <a:t>implements </a:t>
             </a:r>
             <a:r>
               <a:rPr lang="en-US" sz="2400" dirty="0" err="1"/>

</xml_diff>